<commit_message>
Updated versions of slides
</commit_message>
<xml_diff>
--- a/Lectures/11 Machine Learning II Naive Bayes and Decision Trees.pptx
+++ b/Lectures/11 Machine Learning II Naive Bayes and Decision Trees.pptx
@@ -248,7 +248,7 @@
           <a:p>
             <a:fld id="{D3AAB66F-B1B7-D045-B4E8-4F60236F228D}" type="datetimeFigureOut">
               <a:rPr lang="en-US" smtClean="0"/>
-              <a:t>3/18/14</a:t>
+              <a:t>3/23/14</a:t>
             </a:fld>
             <a:endParaRPr lang="en-US"/>
           </a:p>
@@ -414,7 +414,7 @@
           <a:p>
             <a:fld id="{BCCF8E76-06A6-164E-A6FA-EC32C13EB232}" type="datetimeFigureOut">
               <a:rPr lang="en-US" smtClean="0"/>
-              <a:t>3/18/14</a:t>
+              <a:t>3/23/14</a:t>
             </a:fld>
             <a:endParaRPr lang="en-US"/>
           </a:p>
@@ -13649,7 +13649,7 @@
             <a:fld id="{FA3C144B-2939-9A49-B014-915EC3E81866}" type="datetime1">
               <a:rPr lang="en-US" smtClean="0"/>
               <a:pPr/>
-              <a:t>3/18/14</a:t>
+              <a:t>3/23/14</a:t>
             </a:fld>
             <a:endParaRPr lang="en-US" dirty="0"/>
           </a:p>
@@ -14078,7 +14078,7 @@
           <a:p>
             <a:fld id="{76838339-A875-5E45-AB3F-AAABD270346A}" type="datetime1">
               <a:rPr lang="en-US" smtClean="0"/>
-              <a:t>3/18/14</a:t>
+              <a:t>3/23/14</a:t>
             </a:fld>
             <a:endParaRPr lang="en-US"/>
           </a:p>
@@ -14364,7 +14364,7 @@
             <a:fld id="{FA3C144B-2939-9A49-B014-915EC3E81866}" type="datetime1">
               <a:rPr lang="en-US" smtClean="0"/>
               <a:pPr/>
-              <a:t>3/18/14</a:t>
+              <a:t>3/23/14</a:t>
             </a:fld>
             <a:endParaRPr lang="en-US" dirty="0"/>
           </a:p>
@@ -14846,7 +14846,7 @@
           <a:p>
             <a:fld id="{A73F672F-A5FB-5745-934A-1BF51CA5539C}" type="datetime1">
               <a:rPr lang="en-US" smtClean="0"/>
-              <a:t>3/18/14</a:t>
+              <a:t>3/23/14</a:t>
             </a:fld>
             <a:endParaRPr lang="en-US"/>
           </a:p>
@@ -15188,7 +15188,7 @@
             <a:fld id="{FA3C144B-2939-9A49-B014-915EC3E81866}" type="datetime1">
               <a:rPr lang="en-US" smtClean="0"/>
               <a:pPr/>
-              <a:t>3/18/14</a:t>
+              <a:t>3/23/14</a:t>
             </a:fld>
             <a:endParaRPr lang="en-US" dirty="0"/>
           </a:p>
@@ -15652,7 +15652,7 @@
           <a:p>
             <a:fld id="{6AFE6A63-5EBE-3E48-B0AE-DF655A1ECE76}" type="datetime1">
               <a:rPr lang="en-US" smtClean="0"/>
-              <a:t>3/18/14</a:t>
+              <a:t>3/23/14</a:t>
             </a:fld>
             <a:endParaRPr lang="en-US"/>
           </a:p>
@@ -15971,7 +15971,7 @@
           <a:p>
             <a:fld id="{4A019F0C-9D18-B54A-9AC9-18AA74EDB034}" type="datetime1">
               <a:rPr lang="en-US" smtClean="0"/>
-              <a:t>3/18/14</a:t>
+              <a:t>3/23/14</a:t>
             </a:fld>
             <a:endParaRPr lang="en-US"/>
           </a:p>
@@ -16281,7 +16281,7 @@
             <a:fld id="{FA3C144B-2939-9A49-B014-915EC3E81866}" type="datetime1">
               <a:rPr lang="en-US" smtClean="0"/>
               <a:pPr/>
-              <a:t>3/18/14</a:t>
+              <a:t>3/23/14</a:t>
             </a:fld>
             <a:endParaRPr lang="en-US" dirty="0"/>
           </a:p>
@@ -16544,7 +16544,7 @@
           <a:p>
             <a:fld id="{FA3C144B-2939-9A49-B014-915EC3E81866}" type="datetime1">
               <a:rPr lang="en-US" smtClean="0"/>
-              <a:t>3/18/14</a:t>
+              <a:t>3/23/14</a:t>
             </a:fld>
             <a:endParaRPr lang="en-US" dirty="0"/>
           </a:p>
@@ -16912,7 +16912,7 @@
           <a:p>
             <a:fld id="{7053BEFA-1175-F644-B249-7D41D72BD3FF}" type="datetime1">
               <a:rPr lang="en-US" smtClean="0"/>
-              <a:t>3/18/14</a:t>
+              <a:t>3/23/14</a:t>
             </a:fld>
             <a:endParaRPr lang="en-US"/>
           </a:p>
@@ -17031,7 +17031,7 @@
             <a:fld id="{FA3C144B-2939-9A49-B014-915EC3E81866}" type="datetime1">
               <a:rPr lang="en-US" smtClean="0"/>
               <a:pPr/>
-              <a:t>3/18/14</a:t>
+              <a:t>3/23/14</a:t>
             </a:fld>
             <a:endParaRPr lang="en-US" dirty="0"/>
           </a:p>
@@ -17248,7 +17248,7 @@
             <a:fld id="{FA3C144B-2939-9A49-B014-915EC3E81866}" type="datetime1">
               <a:rPr lang="en-US" smtClean="0"/>
               <a:pPr/>
-              <a:t>3/18/14</a:t>
+              <a:t>3/23/14</a:t>
             </a:fld>
             <a:endParaRPr lang="en-US" dirty="0"/>
           </a:p>
@@ -17493,7 +17493,7 @@
             <a:fld id="{FA3C144B-2939-9A49-B014-915EC3E81866}" type="datetime1">
               <a:rPr lang="en-US" smtClean="0"/>
               <a:pPr/>
-              <a:t>3/18/14</a:t>
+              <a:t>3/23/14</a:t>
             </a:fld>
             <a:endParaRPr lang="en-US" dirty="0"/>
           </a:p>
@@ -17871,7 +17871,7 @@
           <a:p>
             <a:fld id="{111EEF3B-ABF2-AA4E-9E24-0C6256942674}" type="datetime1">
               <a:rPr lang="en-US" smtClean="0"/>
-              <a:t>3/18/14</a:t>
+              <a:t>3/23/14</a:t>
             </a:fld>
             <a:endParaRPr lang="en-US"/>
           </a:p>
@@ -18035,7 +18035,7 @@
             <a:fld id="{FA3C144B-2939-9A49-B014-915EC3E81866}" type="datetime1">
               <a:rPr lang="en-US" smtClean="0"/>
               <a:pPr/>
-              <a:t>3/18/14</a:t>
+              <a:t>3/23/14</a:t>
             </a:fld>
             <a:endParaRPr lang="en-US" dirty="0"/>
           </a:p>
@@ -18452,7 +18452,7 @@
             <a:fld id="{FA3C144B-2939-9A49-B014-915EC3E81866}" type="datetime1">
               <a:rPr lang="en-US" smtClean="0"/>
               <a:pPr/>
-              <a:t>3/18/14</a:t>
+              <a:t>3/23/14</a:t>
             </a:fld>
             <a:endParaRPr lang="en-US" dirty="0"/>
           </a:p>
@@ -18768,7 +18768,7 @@
             <a:fld id="{FA3C144B-2939-9A49-B014-915EC3E81866}" type="datetime1">
               <a:rPr lang="en-US" smtClean="0"/>
               <a:pPr/>
-              <a:t>3/18/14</a:t>
+              <a:t>3/23/14</a:t>
             </a:fld>
             <a:endParaRPr lang="en-US" dirty="0"/>
           </a:p>
@@ -19434,7 +19434,7 @@
             <a:fld id="{FA3C144B-2939-9A49-B014-915EC3E81866}" type="datetime1">
               <a:rPr lang="en-US" smtClean="0"/>
               <a:pPr/>
-              <a:t>3/18/14</a:t>
+              <a:t>3/23/14</a:t>
             </a:fld>
             <a:endParaRPr lang="en-US" dirty="0"/>
           </a:p>
@@ -27223,7 +27223,25 @@
               <a:rPr lang="en-US" dirty="0" smtClean="0">
                 <a:latin typeface="Arial" charset="0"/>
               </a:rPr>
-              <a:t>when the error goes up </a:t>
+              <a:t>when keeping the </a:t>
+            </a:r>
+            <a:r>
+              <a:rPr lang="en-US" dirty="0" err="1" smtClean="0">
+                <a:latin typeface="Arial" charset="0"/>
+              </a:rPr>
+              <a:t>subtree</a:t>
+            </a:r>
+            <a:r>
+              <a:rPr lang="en-US" smtClean="0">
+                <a:latin typeface="Arial" charset="0"/>
+              </a:rPr>
+              <a:t> means </a:t>
+            </a:r>
+            <a:r>
+              <a:rPr lang="en-US" dirty="0" smtClean="0">
+                <a:latin typeface="Arial" charset="0"/>
+              </a:rPr>
+              <a:t>the error goes up </a:t>
             </a:r>
             <a:r>
               <a:rPr lang="en-US" i="1" dirty="0" smtClean="0">
@@ -37470,7 +37488,7 @@
           <a:graphicData uri="http://schemas.openxmlformats.org/presentationml/2006/ole">
             <mc:AlternateContent xmlns:mc="http://schemas.openxmlformats.org/markup-compatibility/2006">
               <mc:Choice xmlns:v="urn:schemas-microsoft-com:vml" Requires="v">
-                <p:oleObj spid="_x0000_s677962" name="Bitmap Image" r:id="rId4" imgW="25400" imgH="25400" progId="Paint.Picture">
+                <p:oleObj spid="_x0000_s677968" name="Bitmap Image" r:id="rId4" imgW="25400" imgH="25400" progId="Paint.Picture">
                   <p:embed/>
                 </p:oleObj>
               </mc:Choice>
@@ -37565,7 +37583,7 @@
           <a:graphicData uri="http://schemas.openxmlformats.org/presentationml/2006/ole">
             <mc:AlternateContent xmlns:mc="http://schemas.openxmlformats.org/markup-compatibility/2006">
               <mc:Choice xmlns:v="urn:schemas-microsoft-com:vml" Requires="v">
-                <p:oleObj spid="_x0000_s677963" name="Bitmap Image" r:id="rId6" imgW="3749365" imgH="2483810" progId="Paint.Picture">
+                <p:oleObj spid="_x0000_s677969" name="Bitmap Image" r:id="rId6" imgW="3749365" imgH="2483810" progId="Paint.Picture">
                   <p:embed/>
                 </p:oleObj>
               </mc:Choice>
@@ -46498,7 +46516,7 @@
           <a:graphicData uri="http://schemas.openxmlformats.org/presentationml/2006/ole">
             <mc:AlternateContent xmlns:mc="http://schemas.openxmlformats.org/markup-compatibility/2006">
               <mc:Choice xmlns:v="urn:schemas-microsoft-com:vml" Requires="v">
-                <p:oleObj spid="_x0000_s678986" name="Bitmap Image" r:id="rId4" imgW="25400" imgH="25400" progId="Paint.Picture">
+                <p:oleObj spid="_x0000_s678992" name="Bitmap Image" r:id="rId4" imgW="25400" imgH="25400" progId="Paint.Picture">
                   <p:embed/>
                 </p:oleObj>
               </mc:Choice>
@@ -46593,7 +46611,7 @@
           <a:graphicData uri="http://schemas.openxmlformats.org/presentationml/2006/ole">
             <mc:AlternateContent xmlns:mc="http://schemas.openxmlformats.org/markup-compatibility/2006">
               <mc:Choice xmlns:v="urn:schemas-microsoft-com:vml" Requires="v">
-                <p:oleObj spid="_x0000_s678987" name="Bitmap Image" r:id="rId6" imgW="3749365" imgH="2483810" progId="Paint.Picture">
+                <p:oleObj spid="_x0000_s678993" name="Bitmap Image" r:id="rId6" imgW="3749365" imgH="2483810" progId="Paint.Picture">
                   <p:embed/>
                 </p:oleObj>
               </mc:Choice>
@@ -47755,7 +47773,7 @@
           <a:p>
             <a:fld id="{7053BEFA-1175-F644-B249-7D41D72BD3FF}" type="datetime1">
               <a:rPr lang="en-US" smtClean="0"/>
-              <a:t>3/18/14</a:t>
+              <a:t>3/23/14</a:t>
             </a:fld>
             <a:endParaRPr lang="en-US"/>
           </a:p>
@@ -48065,7 +48083,7 @@
           <a:graphicData uri="http://schemas.openxmlformats.org/presentationml/2006/ole">
             <mc:AlternateContent xmlns:mc="http://schemas.openxmlformats.org/markup-compatibility/2006">
               <mc:Choice xmlns:v="urn:schemas-microsoft-com:vml" Requires="v">
-                <p:oleObj spid="_x0000_s680010" name="Bitmap Image" r:id="rId4" imgW="25400" imgH="25400" progId="Paint.Picture">
+                <p:oleObj spid="_x0000_s680016" name="Bitmap Image" r:id="rId4" imgW="25400" imgH="25400" progId="Paint.Picture">
                   <p:embed/>
                 </p:oleObj>
               </mc:Choice>
@@ -48160,7 +48178,7 @@
           <a:graphicData uri="http://schemas.openxmlformats.org/presentationml/2006/ole">
             <mc:AlternateContent xmlns:mc="http://schemas.openxmlformats.org/markup-compatibility/2006">
               <mc:Choice xmlns:v="urn:schemas-microsoft-com:vml" Requires="v">
-                <p:oleObj spid="_x0000_s680011" name="Bitmap Image" r:id="rId6" imgW="3749365" imgH="2483810" progId="Paint.Picture">
+                <p:oleObj spid="_x0000_s680017" name="Bitmap Image" r:id="rId6" imgW="3749365" imgH="2483810" progId="Paint.Picture">
                   <p:embed/>
                 </p:oleObj>
               </mc:Choice>
@@ -48408,7 +48426,7 @@
           <a:graphicData uri="http://schemas.openxmlformats.org/presentationml/2006/ole">
             <mc:AlternateContent xmlns:mc="http://schemas.openxmlformats.org/markup-compatibility/2006">
               <mc:Choice xmlns:v="urn:schemas-microsoft-com:vml" Requires="v">
-                <p:oleObj spid="_x0000_s681034" name="Bitmap Image" r:id="rId4" imgW="25400" imgH="25400" progId="Paint.Picture">
+                <p:oleObj spid="_x0000_s681040" name="Bitmap Image" r:id="rId4" imgW="25400" imgH="25400" progId="Paint.Picture">
                   <p:embed/>
                 </p:oleObj>
               </mc:Choice>
@@ -48503,7 +48521,7 @@
           <a:graphicData uri="http://schemas.openxmlformats.org/presentationml/2006/ole">
             <mc:AlternateContent xmlns:mc="http://schemas.openxmlformats.org/markup-compatibility/2006">
               <mc:Choice xmlns:v="urn:schemas-microsoft-com:vml" Requires="v">
-                <p:oleObj spid="_x0000_s681035" name="Bitmap Image" r:id="rId6" imgW="3749365" imgH="2483810" progId="Paint.Picture">
+                <p:oleObj spid="_x0000_s681041" name="Bitmap Image" r:id="rId6" imgW="3749365" imgH="2483810" progId="Paint.Picture">
                   <p:embed/>
                 </p:oleObj>
               </mc:Choice>

</xml_diff>